<commit_message>
change the coarse split
</commit_message>
<xml_diff>
--- a/WatchBaBaInMatlab/指导语.pptx
+++ b/WatchBaBaInMatlab/指导语.pptx
@@ -7,6 +7,7 @@
   <p:sldIdLst>
     <p:sldId id="256" r:id="rId2"/>
     <p:sldId id="257" r:id="rId3"/>
+    <p:sldId id="258" r:id="rId4"/>
   </p:sldIdLst>
   <p:sldSz cx="12192000" cy="6858000"/>
   <p:notesSz cx="6858000" cy="9144000"/>
@@ -260,7 +261,7 @@
           <a:p>
             <a:fld id="{A3AE290F-6BB3-4461-A129-B5F324048D8F}" type="datetimeFigureOut">
               <a:rPr lang="zh-CN" altLang="en-US" smtClean="0"/>
-              <a:t>2023/4/8</a:t>
+              <a:t>2023/4/22</a:t>
             </a:fld>
             <a:endParaRPr lang="zh-CN" altLang="en-US"/>
           </a:p>
@@ -458,7 +459,7 @@
           <a:p>
             <a:fld id="{A3AE290F-6BB3-4461-A129-B5F324048D8F}" type="datetimeFigureOut">
               <a:rPr lang="zh-CN" altLang="en-US" smtClean="0"/>
-              <a:t>2023/4/8</a:t>
+              <a:t>2023/4/22</a:t>
             </a:fld>
             <a:endParaRPr lang="zh-CN" altLang="en-US"/>
           </a:p>
@@ -666,7 +667,7 @@
           <a:p>
             <a:fld id="{A3AE290F-6BB3-4461-A129-B5F324048D8F}" type="datetimeFigureOut">
               <a:rPr lang="zh-CN" altLang="en-US" smtClean="0"/>
-              <a:t>2023/4/8</a:t>
+              <a:t>2023/4/22</a:t>
             </a:fld>
             <a:endParaRPr lang="zh-CN" altLang="en-US"/>
           </a:p>
@@ -864,7 +865,7 @@
           <a:p>
             <a:fld id="{A3AE290F-6BB3-4461-A129-B5F324048D8F}" type="datetimeFigureOut">
               <a:rPr lang="zh-CN" altLang="en-US" smtClean="0"/>
-              <a:t>2023/4/8</a:t>
+              <a:t>2023/4/22</a:t>
             </a:fld>
             <a:endParaRPr lang="zh-CN" altLang="en-US"/>
           </a:p>
@@ -1139,7 +1140,7 @@
           <a:p>
             <a:fld id="{A3AE290F-6BB3-4461-A129-B5F324048D8F}" type="datetimeFigureOut">
               <a:rPr lang="zh-CN" altLang="en-US" smtClean="0"/>
-              <a:t>2023/4/8</a:t>
+              <a:t>2023/4/22</a:t>
             </a:fld>
             <a:endParaRPr lang="zh-CN" altLang="en-US"/>
           </a:p>
@@ -1404,7 +1405,7 @@
           <a:p>
             <a:fld id="{A3AE290F-6BB3-4461-A129-B5F324048D8F}" type="datetimeFigureOut">
               <a:rPr lang="zh-CN" altLang="en-US" smtClean="0"/>
-              <a:t>2023/4/8</a:t>
+              <a:t>2023/4/22</a:t>
             </a:fld>
             <a:endParaRPr lang="zh-CN" altLang="en-US"/>
           </a:p>
@@ -1816,7 +1817,7 @@
           <a:p>
             <a:fld id="{A3AE290F-6BB3-4461-A129-B5F324048D8F}" type="datetimeFigureOut">
               <a:rPr lang="zh-CN" altLang="en-US" smtClean="0"/>
-              <a:t>2023/4/8</a:t>
+              <a:t>2023/4/22</a:t>
             </a:fld>
             <a:endParaRPr lang="zh-CN" altLang="en-US"/>
           </a:p>
@@ -1957,7 +1958,7 @@
           <a:p>
             <a:fld id="{A3AE290F-6BB3-4461-A129-B5F324048D8F}" type="datetimeFigureOut">
               <a:rPr lang="zh-CN" altLang="en-US" smtClean="0"/>
-              <a:t>2023/4/8</a:t>
+              <a:t>2023/4/22</a:t>
             </a:fld>
             <a:endParaRPr lang="zh-CN" altLang="en-US"/>
           </a:p>
@@ -2070,7 +2071,7 @@
           <a:p>
             <a:fld id="{A3AE290F-6BB3-4461-A129-B5F324048D8F}" type="datetimeFigureOut">
               <a:rPr lang="zh-CN" altLang="en-US" smtClean="0"/>
-              <a:t>2023/4/8</a:t>
+              <a:t>2023/4/22</a:t>
             </a:fld>
             <a:endParaRPr lang="zh-CN" altLang="en-US"/>
           </a:p>
@@ -2381,7 +2382,7 @@
           <a:p>
             <a:fld id="{A3AE290F-6BB3-4461-A129-B5F324048D8F}" type="datetimeFigureOut">
               <a:rPr lang="zh-CN" altLang="en-US" smtClean="0"/>
-              <a:t>2023/4/8</a:t>
+              <a:t>2023/4/22</a:t>
             </a:fld>
             <a:endParaRPr lang="zh-CN" altLang="en-US"/>
           </a:p>
@@ -2669,7 +2670,7 @@
           <a:p>
             <a:fld id="{A3AE290F-6BB3-4461-A129-B5F324048D8F}" type="datetimeFigureOut">
               <a:rPr lang="zh-CN" altLang="en-US" smtClean="0"/>
-              <a:t>2023/4/8</a:t>
+              <a:t>2023/4/22</a:t>
             </a:fld>
             <a:endParaRPr lang="zh-CN" altLang="en-US"/>
           </a:p>
@@ -2910,7 +2911,7 @@
           <a:p>
             <a:fld id="{A3AE290F-6BB3-4461-A129-B5F324048D8F}" type="datetimeFigureOut">
               <a:rPr lang="zh-CN" altLang="en-US" smtClean="0"/>
-              <a:t>2023/4/8</a:t>
+              <a:t>2023/4/22</a:t>
             </a:fld>
             <a:endParaRPr lang="zh-CN" altLang="en-US"/>
           </a:p>
@@ -3438,6 +3439,42 @@
           <a:chExt cx="0" cy="0"/>
         </a:xfrm>
       </p:grpSpPr>
+      <p:pic>
+        <p:nvPicPr>
+          <p:cNvPr id="5" name="图片 4">
+            <a:extLst>
+              <a:ext uri="{FF2B5EF4-FFF2-40B4-BE49-F238E27FC236}">
+                <a16:creationId xmlns:a16="http://schemas.microsoft.com/office/drawing/2014/main" id="{6A513DC2-8178-4F8B-A77E-08606CC97168}"/>
+              </a:ext>
+            </a:extLst>
+          </p:cNvPr>
+          <p:cNvPicPr>
+            <a:picLocks noChangeAspect="1"/>
+          </p:cNvPicPr>
+          <p:nvPr/>
+        </p:nvPicPr>
+        <p:blipFill>
+          <a:blip r:embed="rId2">
+            <a:extLst>
+              <a:ext uri="{28A0092B-C50C-407E-A947-70E740481C1C}">
+                <a14:useLocalDpi xmlns:a14="http://schemas.microsoft.com/office/drawing/2010/main" val="0"/>
+              </a:ext>
+            </a:extLst>
+          </a:blip>
+          <a:stretch>
+            <a:fillRect/>
+          </a:stretch>
+        </p:blipFill>
+        <p:spPr>
+          <a:xfrm>
+            <a:off x="3279837" y="368011"/>
+            <a:ext cx="10492810" cy="5900305"/>
+          </a:xfrm>
+          <a:prstGeom prst="rect">
+            <a:avLst/>
+          </a:prstGeom>
+        </p:spPr>
+      </p:pic>
       <p:sp>
         <p:nvSpPr>
           <p:cNvPr id="4" name="文本框 3">
@@ -3452,8 +3489,8 @@
         </p:nvSpPr>
         <p:spPr>
           <a:xfrm>
-            <a:off x="641022" y="535908"/>
-            <a:ext cx="10909956" cy="6001643"/>
+            <a:off x="482147" y="674400"/>
+            <a:ext cx="5807817" cy="5704752"/>
           </a:xfrm>
           <a:prstGeom prst="rect">
             <a:avLst/>
@@ -3479,7 +3516,6 @@
                   <a:schemeClr val="bg1"/>
                 </a:solidFill>
                 <a:effectLst/>
-                <a:latin typeface="Calibri" panose="020F0502020204030204" pitchFamily="34" charset="0"/>
               </a:rPr>
               <a:t>	</a:t>
             </a:r>
@@ -3619,9 +3655,16 @@
                   <a:schemeClr val="bg1"/>
                 </a:solidFill>
                 <a:effectLst/>
-                <a:latin typeface="宋体" panose="02010600030101010101" pitchFamily="2" charset="-122"/>
               </a:rPr>
               <a:t>“</a:t>
+            </a:r>
+            <a:r>
+              <a:rPr lang="en-US" altLang="zh-CN" sz="3200" dirty="0">
+                <a:solidFill>
+                  <a:schemeClr val="bg1"/>
+                </a:solidFill>
+              </a:rPr>
+              <a:t>XX</a:t>
             </a:r>
             <a:r>
               <a:rPr lang="en-US" altLang="zh-CN" sz="3200" b="0" i="0" dirty="0">
@@ -3629,9 +3672,8 @@
                   <a:schemeClr val="bg1"/>
                 </a:solidFill>
                 <a:effectLst/>
-                <a:latin typeface="宋体" panose="02010600030101010101" pitchFamily="2" charset="-122"/>
               </a:rPr>
-              <a:t>XX”</a:t>
+              <a:t>”</a:t>
             </a:r>
             <a:r>
               <a:rPr lang="zh-CN" altLang="en-US" sz="3200" b="0" i="0" dirty="0">
@@ -3639,7 +3681,6 @@
                   <a:schemeClr val="bg1"/>
                 </a:solidFill>
                 <a:effectLst/>
-                <a:latin typeface="宋体" panose="02010600030101010101" pitchFamily="2" charset="-122"/>
               </a:rPr>
               <a:t>对应</a:t>
             </a:r>
@@ -3651,7 +3692,197 @@
                 <a:effectLst/>
                 <a:ea typeface="Calibri" panose="020F0502020204030204" pitchFamily="34" charset="0"/>
               </a:rPr>
-              <a:t>的物体在游戏世界中移动，与其他物体交互。在游戏中，另一个重要的属性词是“胜利”，当具有“你”属性的物体和具有“胜利”属性的物体位置重合时，玩家在当前关卡获得胜利</a:t>
+              <a:t>的物体在游戏世界中移动，与其他物体交互。</a:t>
+            </a:r>
+            <a:endParaRPr lang="zh-CN" altLang="en-US" sz="3200" dirty="0">
+              <a:solidFill>
+                <a:schemeClr val="bg1"/>
+              </a:solidFill>
+              <a:ea typeface="宋体" panose="02010600030101010101" pitchFamily="2" charset="-122"/>
+              <a:cs typeface="Times New Roman" panose="02020603050405020304" pitchFamily="18" charset="0"/>
+            </a:endParaRPr>
+          </a:p>
+        </p:txBody>
+      </p:sp>
+      <p:sp>
+        <p:nvSpPr>
+          <p:cNvPr id="6" name="矩形 5">
+            <a:extLst>
+              <a:ext uri="{FF2B5EF4-FFF2-40B4-BE49-F238E27FC236}">
+                <a16:creationId xmlns:a16="http://schemas.microsoft.com/office/drawing/2014/main" id="{2CD364C0-0DBD-4A56-A216-C7743A5D7823}"/>
+              </a:ext>
+            </a:extLst>
+          </p:cNvPr>
+          <p:cNvSpPr/>
+          <p:nvPr/>
+        </p:nvSpPr>
+        <p:spPr>
+          <a:xfrm>
+            <a:off x="6493162" y="1736436"/>
+            <a:ext cx="1524001" cy="701964"/>
+          </a:xfrm>
+          <a:prstGeom prst="rect">
+            <a:avLst/>
+          </a:prstGeom>
+          <a:noFill/>
+          <a:ln w="38100">
+            <a:solidFill>
+              <a:schemeClr val="bg1"/>
+            </a:solidFill>
+          </a:ln>
+        </p:spPr>
+        <p:style>
+          <a:lnRef idx="2">
+            <a:schemeClr val="accent1">
+              <a:shade val="50000"/>
+            </a:schemeClr>
+          </a:lnRef>
+          <a:fillRef idx="1">
+            <a:schemeClr val="accent1"/>
+          </a:fillRef>
+          <a:effectRef idx="0">
+            <a:schemeClr val="accent1"/>
+          </a:effectRef>
+          <a:fontRef idx="minor">
+            <a:schemeClr val="lt1"/>
+          </a:fontRef>
+        </p:style>
+        <p:txBody>
+          <a:bodyPr rtlCol="0" anchor="ctr"/>
+          <a:lstStyle/>
+          <a:p>
+            <a:pPr algn="ctr"/>
+            <a:endParaRPr lang="zh-CN" altLang="en-US"/>
+          </a:p>
+        </p:txBody>
+      </p:sp>
+    </p:spTree>
+    <p:extLst>
+      <p:ext uri="{BB962C8B-B14F-4D97-AF65-F5344CB8AC3E}">
+        <p14:creationId xmlns:p14="http://schemas.microsoft.com/office/powerpoint/2010/main" val="1981559778"/>
+      </p:ext>
+    </p:extLst>
+  </p:cSld>
+  <p:clrMapOvr>
+    <a:masterClrMapping/>
+  </p:clrMapOvr>
+</p:sld>
+</file>
+
+<file path=ppt/slides/slide3.xml><?xml version="1.0" encoding="utf-8"?>
+<p:sld xmlns:a="http://schemas.openxmlformats.org/drawingml/2006/main" xmlns:r="http://schemas.openxmlformats.org/officeDocument/2006/relationships" xmlns:p="http://schemas.openxmlformats.org/presentationml/2006/main">
+  <p:cSld>
+    <p:bg>
+      <p:bgPr>
+        <a:solidFill>
+          <a:schemeClr val="tx1"/>
+        </a:solidFill>
+        <a:effectLst/>
+      </p:bgPr>
+    </p:bg>
+    <p:spTree>
+      <p:nvGrpSpPr>
+        <p:cNvPr id="1" name=""/>
+        <p:cNvGrpSpPr/>
+        <p:nvPr/>
+      </p:nvGrpSpPr>
+      <p:grpSpPr>
+        <a:xfrm>
+          <a:off x="0" y="0"/>
+          <a:ext cx="0" cy="0"/>
+          <a:chOff x="0" y="0"/>
+          <a:chExt cx="0" cy="0"/>
+        </a:xfrm>
+      </p:grpSpPr>
+      <p:pic>
+        <p:nvPicPr>
+          <p:cNvPr id="3" name="图片 2">
+            <a:extLst>
+              <a:ext uri="{FF2B5EF4-FFF2-40B4-BE49-F238E27FC236}">
+                <a16:creationId xmlns:a16="http://schemas.microsoft.com/office/drawing/2014/main" id="{74B6E4AB-8132-4CC0-B7E1-C28934BDCFA1}"/>
+              </a:ext>
+            </a:extLst>
+          </p:cNvPr>
+          <p:cNvPicPr>
+            <a:picLocks noChangeAspect="1"/>
+          </p:cNvPicPr>
+          <p:nvPr/>
+        </p:nvPicPr>
+        <p:blipFill>
+          <a:blip r:embed="rId2">
+            <a:extLst>
+              <a:ext uri="{28A0092B-C50C-407E-A947-70E740481C1C}">
+                <a14:useLocalDpi xmlns:a14="http://schemas.microsoft.com/office/drawing/2010/main" val="0"/>
+              </a:ext>
+            </a:extLst>
+          </a:blip>
+          <a:stretch>
+            <a:fillRect/>
+          </a:stretch>
+        </p:blipFill>
+        <p:spPr>
+          <a:xfrm>
+            <a:off x="3796146" y="471145"/>
+            <a:ext cx="10459685" cy="5881678"/>
+          </a:xfrm>
+          <a:prstGeom prst="rect">
+            <a:avLst/>
+          </a:prstGeom>
+        </p:spPr>
+      </p:pic>
+      <p:sp>
+        <p:nvSpPr>
+          <p:cNvPr id="4" name="文本框 3">
+            <a:extLst>
+              <a:ext uri="{FF2B5EF4-FFF2-40B4-BE49-F238E27FC236}">
+                <a16:creationId xmlns:a16="http://schemas.microsoft.com/office/drawing/2014/main" id="{D1441AD8-7E16-478B-9222-619B43C931DC}"/>
+              </a:ext>
+            </a:extLst>
+          </p:cNvPr>
+          <p:cNvSpPr txBox="1"/>
+          <p:nvPr/>
+        </p:nvSpPr>
+        <p:spPr>
+          <a:xfrm>
+            <a:off x="465531" y="471145"/>
+            <a:ext cx="6526396" cy="6001643"/>
+          </a:xfrm>
+          <a:prstGeom prst="rect">
+            <a:avLst/>
+          </a:prstGeom>
+          <a:solidFill>
+            <a:schemeClr val="tx1"/>
+          </a:solidFill>
+          <a:ln>
+            <a:solidFill>
+              <a:schemeClr val="tx1"/>
+            </a:solidFill>
+          </a:ln>
+        </p:spPr>
+        <p:txBody>
+          <a:bodyPr wrap="square" rtlCol="0">
+            <a:spAutoFit/>
+          </a:bodyPr>
+          <a:lstStyle/>
+          <a:p>
+            <a:r>
+              <a:rPr lang="en-US" altLang="zh-CN" sz="3200" b="0" i="0" dirty="0">
+                <a:solidFill>
+                  <a:schemeClr val="bg1"/>
+                </a:solidFill>
+                <a:effectLst/>
+              </a:rPr>
+              <a:t>	</a:t>
+            </a:r>
+            <a:r>
+              <a:rPr lang="zh-CN" altLang="en-US" sz="3200" b="0" i="0" dirty="0">
+                <a:solidFill>
+                  <a:schemeClr val="bg1"/>
+                </a:solidFill>
+                <a:effectLst/>
+                <a:ea typeface="Calibri" panose="020F0502020204030204" pitchFamily="34" charset="0"/>
+              </a:rPr>
+              <a:t>在游戏中，另一个重要的属性词是“胜利”，当具有“你”属性的物体和具有“胜利”属性的物体位置重合时，玩家在当前关卡获得胜利</a:t>
             </a:r>
             <a:r>
               <a:rPr lang="zh-CN" altLang="en-US" sz="3200" b="0" i="0" dirty="0">
@@ -3679,7 +3910,6 @@
                   <a:schemeClr val="bg1"/>
                 </a:solidFill>
                 <a:effectLst/>
-                <a:latin typeface="Calibri" panose="020F0502020204030204" pitchFamily="34" charset="0"/>
               </a:rPr>
               <a:t> </a:t>
             </a:r>
@@ -3687,7 +3917,6 @@
               <a:solidFill>
                 <a:schemeClr val="bg1"/>
               </a:solidFill>
-              <a:latin typeface="宋体" panose="02010600030101010101" pitchFamily="2" charset="-122"/>
               <a:ea typeface="宋体" panose="02010600030101010101" pitchFamily="2" charset="-122"/>
               <a:cs typeface="Times New Roman" panose="02020603050405020304" pitchFamily="18" charset="0"/>
             </a:endParaRPr>
@@ -3697,7 +3926,7 @@
     </p:spTree>
     <p:extLst>
       <p:ext uri="{BB962C8B-B14F-4D97-AF65-F5344CB8AC3E}">
-        <p14:creationId xmlns:p14="http://schemas.microsoft.com/office/powerpoint/2010/main" val="1981559778"/>
+        <p14:creationId xmlns:p14="http://schemas.microsoft.com/office/powerpoint/2010/main" val="3783640047"/>
       </p:ext>
     </p:extLst>
   </p:cSld>

</xml_diff>